<commit_message>
updated docu and presentation
</commit_message>
<xml_diff>
--- a/Doku/Präsentation_KV_SE_Gruppe3.pptx
+++ b/Doku/Präsentation_KV_SE_Gruppe3.pptx
@@ -127,6 +127,10 @@
 </p:presentation>
 </file>
 
+<file path=ppt/revisionInfo.xml><?xml version="1.0" encoding="utf-8"?>
+<p1510:revInfo xmlns:a="http://schemas.openxmlformats.org/drawingml/2006/main" xmlns:r="http://schemas.openxmlformats.org/officeDocument/2006/relationships" xmlns:p1510="http://schemas.microsoft.com/office/powerpoint/2015/10/main"/>
+</file>
+
 <file path=ppt/notesMasters/notesMaster1.xml><?xml version="1.0" encoding="utf-8"?>
 <p:notesMaster xmlns:a="http://schemas.openxmlformats.org/drawingml/2006/main" xmlns:r="http://schemas.openxmlformats.org/officeDocument/2006/relationships" xmlns:p="http://schemas.openxmlformats.org/presentationml/2006/main">
   <p:cSld>
@@ -273,35 +277,35 @@
           <a:p>
             <a:pPr lvl="0"/>
             <a:r>
-              <a:rPr lang="de-DE" smtClean="0"/>
+              <a:rPr lang="de-DE"/>
               <a:t>Formatvorlagen des Textmasters bearbeiten</a:t>
             </a:r>
           </a:p>
           <a:p>
             <a:pPr lvl="1"/>
             <a:r>
-              <a:rPr lang="de-DE" smtClean="0"/>
+              <a:rPr lang="de-DE"/>
               <a:t>Zweite Ebene</a:t>
             </a:r>
           </a:p>
           <a:p>
             <a:pPr lvl="2"/>
             <a:r>
-              <a:rPr lang="de-DE" smtClean="0"/>
+              <a:rPr lang="de-DE"/>
               <a:t>Dritte Ebene</a:t>
             </a:r>
           </a:p>
           <a:p>
             <a:pPr lvl="3"/>
             <a:r>
-              <a:rPr lang="de-DE" smtClean="0"/>
+              <a:rPr lang="de-DE"/>
               <a:t>Vierte Ebene</a:t>
             </a:r>
           </a:p>
           <a:p>
             <a:pPr lvl="4"/>
             <a:r>
-              <a:rPr lang="de-DE" smtClean="0"/>
+              <a:rPr lang="de-DE"/>
               <a:t>Fünfte Ebene</a:t>
             </a:r>
             <a:endParaRPr lang="de-AT"/>
@@ -4011,7 +4015,7 @@
               </a:lnSpc>
             </a:pPr>
             <a:r>
-              <a:rPr lang="de-AT" sz="3600" cap="all" dirty="0" smtClean="0">
+              <a:rPr lang="de-AT" sz="3600" cap="all" dirty="0">
                 <a:solidFill>
                   <a:schemeClr val="bg1"/>
                 </a:solidFill>
@@ -4019,27 +4023,19 @@
               <a:t>Gruppe 3:</a:t>
             </a:r>
             <a:br>
-              <a:rPr lang="de-AT" sz="3600" cap="all" dirty="0" smtClean="0">
+              <a:rPr lang="de-AT" sz="3600" cap="all" dirty="0">
                 <a:solidFill>
                   <a:schemeClr val="bg1"/>
                 </a:solidFill>
               </a:rPr>
             </a:br>
             <a:r>
-              <a:rPr lang="de-AT" sz="3600" cap="all" dirty="0" smtClean="0">
+              <a:rPr lang="de-AT" sz="3600" cap="all" dirty="0">
                 <a:solidFill>
                   <a:schemeClr val="bg1"/>
                 </a:solidFill>
               </a:rPr>
               <a:t>Veranstaltungs-service</a:t>
-            </a:r>
-            <a:r>
-              <a:rPr lang="de-AT" sz="4800" cap="all" dirty="0">
-                <a:solidFill>
-                  <a:schemeClr val="bg1"/>
-                </a:solidFill>
-              </a:rPr>
-              <a:t/>
             </a:r>
             <a:br>
               <a:rPr lang="de-AT" sz="4800" cap="all" dirty="0">
@@ -4083,7 +4079,7 @@
                 <a:spcPct val="70000"/>
               </a:lnSpc>
             </a:pPr>
-            <a:endParaRPr lang="de-AT" sz="2000" dirty="0" smtClean="0">
+            <a:endParaRPr lang="de-AT" sz="2000" dirty="0">
               <a:solidFill>
                 <a:schemeClr val="bg1"/>
               </a:solidFill>
@@ -4096,7 +4092,7 @@
               </a:lnSpc>
             </a:pPr>
             <a:r>
-              <a:rPr lang="de-AT" sz="2000" dirty="0" smtClean="0">
+              <a:rPr lang="de-AT" sz="2000" dirty="0">
                 <a:solidFill>
                   <a:schemeClr val="bg1"/>
                 </a:solidFill>
@@ -4111,18 +4107,13 @@
               </a:lnSpc>
             </a:pPr>
             <a:r>
-              <a:rPr lang="de-AT" sz="2000" dirty="0" smtClean="0">
+              <a:rPr lang="de-AT" sz="2000" dirty="0">
                 <a:solidFill>
                   <a:schemeClr val="bg1"/>
                 </a:solidFill>
               </a:rPr>
               <a:t>Matthias Winkler</a:t>
             </a:r>
-            <a:endParaRPr lang="de-AT" sz="2000" dirty="0">
-              <a:solidFill>
-                <a:schemeClr val="bg1"/>
-              </a:solidFill>
-            </a:endParaRPr>
           </a:p>
           <a:p>
             <a:pPr algn="l">
@@ -4131,20 +4122,12 @@
               </a:lnSpc>
             </a:pPr>
             <a:r>
-              <a:rPr lang="de-AT" sz="2000" dirty="0" smtClean="0">
-                <a:solidFill>
-                  <a:schemeClr val="bg1"/>
-                </a:solidFill>
-              </a:rPr>
-              <a:t>Thomas </a:t>
-            </a:r>
-            <a:r>
               <a:rPr lang="de-AT" sz="2000" dirty="0">
                 <a:solidFill>
                   <a:schemeClr val="bg1"/>
                 </a:solidFill>
               </a:rPr>
-              <a:t>Weberndorfer</a:t>
+              <a:t>Thomas Weberndorfer</a:t>
             </a:r>
           </a:p>
           <a:p>
@@ -4165,7 +4148,7 @@
                 <a:spcPct val="70000"/>
               </a:lnSpc>
             </a:pPr>
-            <a:endParaRPr lang="de-AT" sz="1000" dirty="0" smtClean="0">
+            <a:endParaRPr lang="de-AT" sz="1000" dirty="0">
               <a:solidFill>
                 <a:schemeClr val="bg1"/>
               </a:solidFill>
@@ -4231,7 +4214,7 @@
           <a:lstStyle/>
           <a:p>
             <a:r>
-              <a:rPr lang="de-AT" dirty="0" err="1" smtClean="0"/>
+              <a:rPr lang="de-AT" dirty="0" err="1"/>
               <a:t>Livedemo</a:t>
             </a:r>
             <a:endParaRPr lang="de-AT" dirty="0"/>
@@ -4291,13 +4274,6 @@
   <p:clrMapOvr>
     <a:masterClrMapping/>
   </p:clrMapOvr>
-  <p:timing>
-    <p:tnLst>
-      <p:par>
-        <p:cTn id="1" dur="indefinite" restart="never" nodeType="tmRoot"/>
-      </p:par>
-    </p:tnLst>
-  </p:timing>
 </p:sld>
 </file>
 
@@ -4379,16 +4355,12 @@
           <a:bodyPr/>
           <a:lstStyle/>
           <a:p>
-            <a:endParaRPr lang="de-DE" dirty="0" smtClean="0"/>
-          </a:p>
-          <a:p>
-            <a:r>
-              <a:rPr lang="de-DE" dirty="0" smtClean="0"/>
-              <a:t>Posten </a:t>
-            </a:r>
+            <a:endParaRPr lang="de-DE" dirty="0"/>
+          </a:p>
+          <a:p>
             <a:r>
               <a:rPr lang="de-DE" dirty="0"/>
-              <a:t>von Veranstaltungen sowie deren Ergebnisse, z.B. Fußball, Skifahren, und Gruppen von Vereinen/Personen, die in Tabellen geführt werden.</a:t>
+              <a:t>Posten von Veranstaltungen sowie deren Ergebnisse, z.B. Fußball, Skifahren, und Gruppen von Vereinen/Personen, die in Tabellen geführt werden.</a:t>
             </a:r>
             <a:endParaRPr lang="de-AT" b="1" dirty="0"/>
           </a:p>
@@ -4407,13 +4379,6 @@
   <p:clrMapOvr>
     <a:masterClrMapping/>
   </p:clrMapOvr>
-  <p:timing>
-    <p:tnLst>
-      <p:par>
-        <p:cTn id="1" dur="indefinite" restart="never" nodeType="tmRoot"/>
-      </p:par>
-    </p:tnLst>
-  </p:timing>
 </p:sld>
 </file>
 
@@ -4450,10 +4415,9 @@
           <a:lstStyle/>
           <a:p>
             <a:r>
-              <a:rPr lang="de-AT" dirty="0" smtClean="0"/>
+              <a:rPr lang="de-AT" dirty="0"/>
               <a:t>Verwendete Technologien</a:t>
             </a:r>
-            <a:endParaRPr lang="de-AT" dirty="0"/>
           </a:p>
         </p:txBody>
       </p:sp>
@@ -4790,10 +4754,9 @@
           <a:lstStyle/>
           <a:p>
             <a:r>
-              <a:rPr lang="de-AT" dirty="0" smtClean="0"/>
+              <a:rPr lang="de-AT" dirty="0"/>
               <a:t>Mongo DB</a:t>
             </a:r>
-            <a:endParaRPr lang="de-AT" dirty="0"/>
           </a:p>
         </p:txBody>
       </p:sp>
@@ -4815,16 +4778,12 @@
           <a:lstStyle/>
           <a:p>
             <a:r>
-              <a:rPr lang="de-AT" sz="2400" dirty="0" err="1" smtClean="0"/>
+              <a:rPr lang="de-AT" sz="2400" dirty="0" err="1"/>
               <a:t>NoSql</a:t>
             </a:r>
             <a:r>
-              <a:rPr lang="de-AT" sz="2400" dirty="0" smtClean="0"/>
-              <a:t> </a:t>
-            </a:r>
-            <a:r>
-              <a:rPr lang="de-AT" sz="2400" dirty="0" smtClean="0"/>
-              <a:t>– Datenbank</a:t>
+              <a:rPr lang="de-AT" sz="2400" dirty="0"/>
+              <a:t> – Datenbank</a:t>
             </a:r>
           </a:p>
           <a:p>
@@ -4832,7 +4791,7 @@
           </a:p>
           <a:p>
             <a:r>
-              <a:rPr lang="de-AT" sz="2400" dirty="0" smtClean="0"/>
+              <a:rPr lang="de-AT" sz="2400" dirty="0"/>
               <a:t>Datenbankaufbau wie JSON</a:t>
             </a:r>
           </a:p>
@@ -4841,7 +4800,7 @@
           </a:p>
           <a:p>
             <a:r>
-              <a:rPr lang="de-AT" sz="2400" dirty="0" smtClean="0"/>
+              <a:rPr lang="de-AT" sz="2400" dirty="0"/>
               <a:t>Open Source Produkt</a:t>
             </a:r>
           </a:p>
@@ -4850,15 +4809,15 @@
           </a:p>
           <a:p>
             <a:r>
-              <a:rPr lang="de-AT" sz="2400" dirty="0" smtClean="0"/>
+              <a:rPr lang="de-AT" sz="2400" dirty="0"/>
               <a:t>Einfach </a:t>
             </a:r>
             <a:r>
-              <a:rPr lang="de-AT" sz="2400" dirty="0" err="1" smtClean="0"/>
+              <a:rPr lang="de-AT" sz="2400" dirty="0" err="1"/>
               <a:t>Node</a:t>
             </a:r>
             <a:r>
-              <a:rPr lang="de-AT" sz="2400" dirty="0" smtClean="0"/>
+              <a:rPr lang="de-AT" sz="2400" dirty="0"/>
               <a:t> JS Anbindung  </a:t>
             </a:r>
           </a:p>
@@ -4954,35 +4913,43 @@
           <a:lstStyle/>
           <a:p>
             <a:r>
-              <a:rPr lang="de-AT" dirty="0" err="1" smtClean="0"/>
+              <a:rPr lang="de-AT" dirty="0" err="1"/>
               <a:t>Node</a:t>
             </a:r>
             <a:r>
-              <a:rPr lang="de-AT" dirty="0" smtClean="0"/>
+              <a:rPr lang="de-AT" dirty="0"/>
               <a:t> JS</a:t>
             </a:r>
+          </a:p>
+        </p:txBody>
+      </p:sp>
+      <p:sp>
+        <p:nvSpPr>
+          <p:cNvPr id="3" name="Inhaltsplatzhalter 2"/>
+          <p:cNvSpPr>
+            <a:spLocks noGrp="1"/>
+          </p:cNvSpPr>
+          <p:nvPr>
+            <p:ph idx="1"/>
+          </p:nvPr>
+        </p:nvSpPr>
+        <p:spPr/>
+        <p:txBody>
+          <a:bodyPr/>
+          <a:lstStyle/>
+          <a:p>
+            <a:r>
+              <a:rPr lang="de-AT" dirty="0"/>
+              <a:t>Serverseitige Verwendung von JavaScript</a:t>
+            </a:r>
+          </a:p>
+          <a:p>
             <a:endParaRPr lang="de-AT" dirty="0"/>
           </a:p>
-        </p:txBody>
-      </p:sp>
-      <p:sp>
-        <p:nvSpPr>
-          <p:cNvPr id="3" name="Inhaltsplatzhalter 2"/>
-          <p:cNvSpPr>
-            <a:spLocks noGrp="1"/>
-          </p:cNvSpPr>
-          <p:nvPr>
-            <p:ph idx="1"/>
-          </p:nvPr>
-        </p:nvSpPr>
-        <p:spPr/>
-        <p:txBody>
-          <a:bodyPr/>
-          <a:lstStyle/>
-          <a:p>
-            <a:r>
-              <a:rPr lang="de-AT" dirty="0" smtClean="0"/>
-              <a:t>Serverseitige Verwendung von JavaScript</a:t>
+          <a:p>
+            <a:r>
+              <a:rPr lang="de-AT" dirty="0"/>
+              <a:t>Sehr einfach und schnell verwendbar</a:t>
             </a:r>
           </a:p>
           <a:p>
@@ -4990,16 +4957,7 @@
           </a:p>
           <a:p>
             <a:r>
-              <a:rPr lang="de-AT" dirty="0" smtClean="0"/>
-              <a:t>Sehr einfach und schnell verwendbar</a:t>
-            </a:r>
-          </a:p>
-          <a:p>
-            <a:endParaRPr lang="de-AT" dirty="0"/>
-          </a:p>
-          <a:p>
-            <a:r>
-              <a:rPr lang="de-AT" dirty="0" smtClean="0"/>
+              <a:rPr lang="de-AT" dirty="0"/>
               <a:t>Gute Performance</a:t>
             </a:r>
           </a:p>
@@ -5098,7 +5056,7 @@
           <a:lstStyle/>
           <a:p>
             <a:r>
-              <a:rPr lang="de-AT" dirty="0" err="1" smtClean="0"/>
+              <a:rPr lang="de-AT" dirty="0" err="1"/>
               <a:t>AngularJS</a:t>
             </a:r>
             <a:endParaRPr lang="de-AT" dirty="0"/>
@@ -5121,7 +5079,7 @@
           <a:lstStyle/>
           <a:p>
             <a:r>
-              <a:rPr lang="de-AT" dirty="0" smtClean="0"/>
+              <a:rPr lang="de-AT" dirty="0"/>
               <a:t>Clientseitige Verwendung von JavaScript</a:t>
             </a:r>
           </a:p>
@@ -5130,7 +5088,7 @@
           </a:p>
           <a:p>
             <a:r>
-              <a:rPr lang="de-AT" dirty="0" smtClean="0"/>
+              <a:rPr lang="de-AT" dirty="0"/>
               <a:t>Kombinierbar mit HTML + Bootstrap</a:t>
             </a:r>
           </a:p>
@@ -5139,7 +5097,7 @@
           </a:p>
           <a:p>
             <a:r>
-              <a:rPr lang="de-AT" dirty="0" smtClean="0"/>
+              <a:rPr lang="de-AT" dirty="0"/>
               <a:t>MVC-Pattern</a:t>
             </a:r>
           </a:p>
@@ -5148,18 +5106,17 @@
           </a:p>
           <a:p>
             <a:r>
-              <a:rPr lang="de-AT" dirty="0" smtClean="0"/>
+              <a:rPr lang="de-AT" dirty="0"/>
               <a:t>Dynamische Generierung von </a:t>
             </a:r>
             <a:r>
-              <a:rPr lang="de-AT" dirty="0" err="1" smtClean="0"/>
+              <a:rPr lang="de-AT" dirty="0" err="1"/>
               <a:t>Websiten</a:t>
             </a:r>
             <a:r>
-              <a:rPr lang="de-AT" dirty="0" smtClean="0"/>
+              <a:rPr lang="de-AT" dirty="0"/>
               <a:t> </a:t>
             </a:r>
-            <a:endParaRPr lang="de-AT" dirty="0"/>
           </a:p>
         </p:txBody>
       </p:sp>
@@ -5250,10 +5207,9 @@
           <a:lstStyle/>
           <a:p>
             <a:r>
-              <a:rPr lang="de-AT" dirty="0" smtClean="0"/>
+              <a:rPr lang="de-AT" dirty="0"/>
               <a:t>Konzept und Entwicklung</a:t>
             </a:r>
-            <a:endParaRPr lang="de-AT" dirty="0"/>
           </a:p>
         </p:txBody>
       </p:sp>
@@ -5275,7 +5231,7 @@
           <a:lstStyle/>
           <a:p>
             <a:r>
-              <a:rPr lang="de-AT" dirty="0" smtClean="0"/>
+              <a:rPr lang="de-AT" dirty="0"/>
               <a:t>Skizzierung der Oberfläche</a:t>
             </a:r>
           </a:p>
@@ -5284,16 +5240,12 @@
           </a:p>
           <a:p>
             <a:r>
-              <a:rPr lang="de-AT" dirty="0" smtClean="0"/>
-              <a:t>Planung </a:t>
-            </a:r>
-            <a:r>
               <a:rPr lang="de-AT" dirty="0"/>
-              <a:t>der Kommunikation</a:t>
-            </a:r>
-          </a:p>
-          <a:p>
-            <a:endParaRPr lang="de-AT" dirty="0" smtClean="0"/>
+              <a:t>Planung der Kommunikation</a:t>
+            </a:r>
+          </a:p>
+          <a:p>
+            <a:endParaRPr lang="de-AT" dirty="0"/>
           </a:p>
           <a:p>
             <a:r>
@@ -5306,16 +5258,16 @@
           </a:p>
           <a:p>
             <a:r>
-              <a:rPr lang="de-AT" dirty="0" smtClean="0"/>
+              <a:rPr lang="de-AT" dirty="0"/>
               <a:t>Schnittstellendefinition</a:t>
             </a:r>
           </a:p>
           <a:p>
-            <a:endParaRPr lang="de-AT" dirty="0" smtClean="0"/>
-          </a:p>
-          <a:p>
-            <a:r>
-              <a:rPr lang="de-AT" dirty="0" smtClean="0"/>
+            <a:endParaRPr lang="de-AT" dirty="0"/>
+          </a:p>
+          <a:p>
+            <a:r>
+              <a:rPr lang="de-AT" dirty="0"/>
               <a:t>Frontend + Backend parallel Entwickelt</a:t>
             </a:r>
           </a:p>
@@ -5373,10 +5325,9 @@
           <a:lstStyle/>
           <a:p>
             <a:r>
-              <a:rPr lang="de-AT" dirty="0" smtClean="0"/>
+              <a:rPr lang="de-AT" dirty="0"/>
               <a:t>Skizzen</a:t>
             </a:r>
-            <a:endParaRPr lang="de-AT" dirty="0"/>
           </a:p>
         </p:txBody>
       </p:sp>
@@ -5455,41 +5406,121 @@
           <a:lstStyle/>
           <a:p>
             <a:r>
-              <a:rPr lang="de-AT" dirty="0" smtClean="0"/>
+              <a:rPr lang="de-AT" dirty="0"/>
               <a:t>Probleme</a:t>
             </a:r>
+          </a:p>
+        </p:txBody>
+      </p:sp>
+      <p:sp>
+        <p:nvSpPr>
+          <p:cNvPr id="3" name="Inhaltsplatzhalter 2"/>
+          <p:cNvSpPr>
+            <a:spLocks noGrp="1"/>
+          </p:cNvSpPr>
+          <p:nvPr>
+            <p:ph idx="1"/>
+          </p:nvPr>
+        </p:nvSpPr>
+        <p:spPr/>
+        <p:txBody>
+          <a:bodyPr>
+            <a:normAutofit/>
+          </a:bodyPr>
+          <a:lstStyle/>
+          <a:p>
+            <a:r>
+              <a:rPr lang="de-AT" dirty="0"/>
+              <a:t>Datenbank</a:t>
+            </a:r>
+          </a:p>
+          <a:p>
+            <a:pPr lvl="1"/>
+            <a:r>
+              <a:rPr lang="de-AT" dirty="0" err="1"/>
+              <a:t>NoSql</a:t>
+            </a:r>
+            <a:r>
+              <a:rPr lang="de-AT" dirty="0"/>
+              <a:t> </a:t>
+            </a:r>
+            <a:r>
+              <a:rPr lang="de-AT" dirty="0" err="1"/>
+              <a:t>vs</a:t>
+            </a:r>
+            <a:r>
+              <a:rPr lang="de-AT" dirty="0"/>
+              <a:t> klassisches DB</a:t>
+            </a:r>
+          </a:p>
+          <a:p>
+            <a:pPr lvl="1"/>
+            <a:r>
+              <a:rPr lang="de-AT" dirty="0"/>
+              <a:t> Aufteilung von Daten </a:t>
+            </a:r>
+          </a:p>
+          <a:p>
+            <a:r>
+              <a:rPr lang="de-AT" dirty="0" err="1"/>
+              <a:t>Javascript</a:t>
+            </a:r>
+            <a:r>
+              <a:rPr lang="de-AT" dirty="0"/>
+              <a:t> / </a:t>
+            </a:r>
+            <a:r>
+              <a:rPr lang="de-AT" dirty="0" err="1"/>
+              <a:t>NodeJS</a:t>
+            </a:r>
             <a:endParaRPr lang="de-AT" dirty="0"/>
           </a:p>
-        </p:txBody>
-      </p:sp>
-      <p:sp>
-        <p:nvSpPr>
-          <p:cNvPr id="3" name="Inhaltsplatzhalter 2"/>
-          <p:cNvSpPr>
-            <a:spLocks noGrp="1"/>
-          </p:cNvSpPr>
-          <p:nvPr>
-            <p:ph idx="1"/>
-          </p:nvPr>
-        </p:nvSpPr>
-        <p:spPr/>
-        <p:txBody>
-          <a:bodyPr/>
-          <a:lstStyle/>
-          <a:p>
-            <a:r>
-              <a:rPr lang="de-AT" dirty="0" smtClean="0"/>
+          <a:p>
+            <a:pPr lvl="1"/>
+            <a:r>
+              <a:rPr lang="de-AT" dirty="0"/>
+              <a:t>Verständnis von Post, </a:t>
+            </a:r>
+            <a:r>
+              <a:rPr lang="de-AT" dirty="0" err="1"/>
+              <a:t>Get</a:t>
+            </a:r>
+            <a:r>
+              <a:rPr lang="de-AT" dirty="0"/>
+              <a:t>, Delete, Put</a:t>
+            </a:r>
+          </a:p>
+          <a:p>
+            <a:pPr lvl="1"/>
+            <a:r>
+              <a:rPr lang="de-AT" dirty="0"/>
+              <a:t>Aufruf von Funktionen / über „Strings“  </a:t>
+            </a:r>
+          </a:p>
+          <a:p>
+            <a:r>
+              <a:rPr lang="de-AT" dirty="0"/>
+              <a:t>Verständnis von Angular (MVC)</a:t>
+            </a:r>
+          </a:p>
+          <a:p>
+            <a:r>
+              <a:rPr lang="de-AT" dirty="0"/>
               <a:t>Ranking</a:t>
             </a:r>
           </a:p>
           <a:p>
+            <a:pPr lvl="1"/>
+            <a:r>
+              <a:rPr lang="de-AT" dirty="0"/>
+              <a:t>Verschiedene Verteilungssysteme für unterschiedliche Sportarten</a:t>
+            </a:r>
+          </a:p>
+          <a:p>
+            <a:pPr marL="0" indent="0">
+              <a:buNone/>
+            </a:pPr>
             <a:endParaRPr lang="de-AT" dirty="0"/>
-          </a:p>
-          <a:p>
-            <a:r>
-              <a:rPr lang="de-AT" dirty="0" smtClean="0"/>
-              <a:t>Verständnis von Angular (MVC)</a:t>
-            </a:r>
           </a:p>
           <a:p>
             <a:endParaRPr lang="de-AT" dirty="0"/>

</xml_diff>